<commit_message>
add license. update generator, pygame collision, more practice
</commit_message>
<xml_diff>
--- a/Py B - unit 1.pptx
+++ b/Py B - unit 1.pptx
@@ -14,11 +14,15 @@
     <p:sldId id="261" r:id="rId8"/>
     <p:sldId id="262" r:id="rId9"/>
     <p:sldId id="263" r:id="rId10"/>
-    <p:sldId id="264" r:id="rId11"/>
-    <p:sldId id="265" r:id="rId12"/>
-    <p:sldId id="269" r:id="rId13"/>
-    <p:sldId id="283" r:id="rId14"/>
-    <p:sldId id="285" r:id="rId15"/>
+    <p:sldId id="287" r:id="rId11"/>
+    <p:sldId id="264" r:id="rId12"/>
+    <p:sldId id="288" r:id="rId13"/>
+    <p:sldId id="265" r:id="rId14"/>
+    <p:sldId id="269" r:id="rId15"/>
+    <p:sldId id="289" r:id="rId16"/>
+    <p:sldId id="283" r:id="rId17"/>
+    <p:sldId id="290" r:id="rId18"/>
+    <p:sldId id="285" r:id="rId19"/>
   </p:sldIdLst>
   <p:sldSz cx="12192000" cy="6858000"/>
   <p:notesSz cx="6858000" cy="9144000"/>
@@ -125,8 +129,463 @@
 </p:presentation>
 </file>
 
+<file path=ppt/revisionInfo.xml><?xml version="1.0" encoding="utf-8"?>
+<p1510:revInfo xmlns:a="http://schemas.openxmlformats.org/drawingml/2006/main" xmlns:r="http://schemas.openxmlformats.org/officeDocument/2006/relationships" xmlns:p1510="http://schemas.microsoft.com/office/powerpoint/2015/10/main">
+  <p1510:revLst>
+    <p1510:client id="{7838743D-3F48-4729-AECB-23CF92AF3D96}" v="1" dt="2021-10-04T11:33:47.029"/>
+  </p1510:revLst>
+</p1510:revInfo>
+</file>
+
 <file path=ppt/changesInfos/changesInfo1.xml><?xml version="1.0" encoding="utf-8"?>
 <pc:chgInfo xmlns:a="http://schemas.openxmlformats.org/drawingml/2006/main" xmlns:r="http://schemas.openxmlformats.org/officeDocument/2006/relationships" xmlns:ac="http://schemas.microsoft.com/office/drawing/2013/main/command" xmlns:pc="http://schemas.microsoft.com/office/powerpoint/2013/main/command">
+  <pc:docChgLst>
+    <pc:chgData name="Li Lixiang" userId="6104bbfcb56aea79" providerId="LiveId" clId="{23F611FF-0BB3-4599-A6B3-EA82A2B7F99F}"/>
+    <pc:docChg chg="modSld">
+      <pc:chgData name="Li Lixiang" userId="6104bbfcb56aea79" providerId="LiveId" clId="{23F611FF-0BB3-4599-A6B3-EA82A2B7F99F}" dt="2021-08-08T03:13:19.414" v="0" actId="14100"/>
+      <pc:docMkLst>
+        <pc:docMk/>
+      </pc:docMkLst>
+      <pc:sldChg chg="modSp mod">
+        <pc:chgData name="Li Lixiang" userId="6104bbfcb56aea79" providerId="LiveId" clId="{23F611FF-0BB3-4599-A6B3-EA82A2B7F99F}" dt="2021-08-08T03:13:19.414" v="0" actId="14100"/>
+        <pc:sldMkLst>
+          <pc:docMk/>
+          <pc:sldMk cId="3585909810" sldId="283"/>
+        </pc:sldMkLst>
+        <pc:spChg chg="mod">
+          <ac:chgData name="Li Lixiang" userId="6104bbfcb56aea79" providerId="LiveId" clId="{23F611FF-0BB3-4599-A6B3-EA82A2B7F99F}" dt="2021-08-08T03:13:19.414" v="0" actId="14100"/>
+          <ac:spMkLst>
+            <pc:docMk/>
+            <pc:sldMk cId="3585909810" sldId="283"/>
+            <ac:spMk id="3" creationId="{7060439F-2729-478E-B95F-230482B50AA1}"/>
+          </ac:spMkLst>
+        </pc:spChg>
+      </pc:sldChg>
+    </pc:docChg>
+  </pc:docChgLst>
+  <pc:docChgLst>
+    <pc:chgData name="Li Lixiang" userId="6104bbfcb56aea79" providerId="LiveId" clId="{7838743D-3F48-4729-AECB-23CF92AF3D96}"/>
+    <pc:docChg chg="custSel addSld modSld">
+      <pc:chgData name="Li Lixiang" userId="6104bbfcb56aea79" providerId="LiveId" clId="{7838743D-3F48-4729-AECB-23CF92AF3D96}" dt="2021-10-04T11:40:24.383" v="313" actId="1036"/>
+      <pc:docMkLst>
+        <pc:docMk/>
+      </pc:docMkLst>
+      <pc:sldChg chg="modSp mod">
+        <pc:chgData name="Li Lixiang" userId="6104bbfcb56aea79" providerId="LiveId" clId="{7838743D-3F48-4729-AECB-23CF92AF3D96}" dt="2021-10-04T10:58:00.431" v="15" actId="20577"/>
+        <pc:sldMkLst>
+          <pc:docMk/>
+          <pc:sldMk cId="390176306" sldId="259"/>
+        </pc:sldMkLst>
+        <pc:spChg chg="mod">
+          <ac:chgData name="Li Lixiang" userId="6104bbfcb56aea79" providerId="LiveId" clId="{7838743D-3F48-4729-AECB-23CF92AF3D96}" dt="2021-10-04T10:57:29.712" v="1" actId="14100"/>
+          <ac:spMkLst>
+            <pc:docMk/>
+            <pc:sldMk cId="390176306" sldId="259"/>
+            <ac:spMk id="8" creationId="{4F1093A6-9CD0-4695-87C5-1EB70F254480}"/>
+          </ac:spMkLst>
+        </pc:spChg>
+        <pc:spChg chg="mod">
+          <ac:chgData name="Li Lixiang" userId="6104bbfcb56aea79" providerId="LiveId" clId="{7838743D-3F48-4729-AECB-23CF92AF3D96}" dt="2021-10-04T10:58:00.431" v="15" actId="20577"/>
+          <ac:spMkLst>
+            <pc:docMk/>
+            <pc:sldMk cId="390176306" sldId="259"/>
+            <ac:spMk id="10" creationId="{2EBDE9F2-FCF9-4295-BC53-4599B14FE980}"/>
+          </ac:spMkLst>
+        </pc:spChg>
+        <pc:spChg chg="mod">
+          <ac:chgData name="Li Lixiang" userId="6104bbfcb56aea79" providerId="LiveId" clId="{7838743D-3F48-4729-AECB-23CF92AF3D96}" dt="2021-10-04T10:57:20.139" v="0" actId="14100"/>
+          <ac:spMkLst>
+            <pc:docMk/>
+            <pc:sldMk cId="390176306" sldId="259"/>
+            <ac:spMk id="11" creationId="{8BAA5347-9146-4C1C-8E04-9903CE5BDCDB}"/>
+          </ac:spMkLst>
+        </pc:spChg>
+      </pc:sldChg>
+      <pc:sldChg chg="modSp mod">
+        <pc:chgData name="Li Lixiang" userId="6104bbfcb56aea79" providerId="LiveId" clId="{7838743D-3F48-4729-AECB-23CF92AF3D96}" dt="2021-10-04T11:09:15.934" v="151" actId="20577"/>
+        <pc:sldMkLst>
+          <pc:docMk/>
+          <pc:sldMk cId="184123586" sldId="261"/>
+        </pc:sldMkLst>
+        <pc:spChg chg="mod">
+          <ac:chgData name="Li Lixiang" userId="6104bbfcb56aea79" providerId="LiveId" clId="{7838743D-3F48-4729-AECB-23CF92AF3D96}" dt="2021-10-04T11:09:15.934" v="151" actId="20577"/>
+          <ac:spMkLst>
+            <pc:docMk/>
+            <pc:sldMk cId="184123586" sldId="261"/>
+            <ac:spMk id="2" creationId="{5EC01E2D-9CFE-4D5D-8863-3BA90731F07B}"/>
+          </ac:spMkLst>
+        </pc:spChg>
+        <pc:spChg chg="mod">
+          <ac:chgData name="Li Lixiang" userId="6104bbfcb56aea79" providerId="LiveId" clId="{7838743D-3F48-4729-AECB-23CF92AF3D96}" dt="2021-10-04T10:59:47.982" v="16" actId="207"/>
+          <ac:spMkLst>
+            <pc:docMk/>
+            <pc:sldMk cId="184123586" sldId="261"/>
+            <ac:spMk id="3" creationId="{7060439F-2729-478E-B95F-230482B50AA1}"/>
+          </ac:spMkLst>
+        </pc:spChg>
+        <pc:spChg chg="mod">
+          <ac:chgData name="Li Lixiang" userId="6104bbfcb56aea79" providerId="LiveId" clId="{7838743D-3F48-4729-AECB-23CF92AF3D96}" dt="2021-10-04T11:08:58.994" v="145" actId="1076"/>
+          <ac:spMkLst>
+            <pc:docMk/>
+            <pc:sldMk cId="184123586" sldId="261"/>
+            <ac:spMk id="5" creationId="{1B409AB1-02EE-4014-8404-40CE3FDCD729}"/>
+          </ac:spMkLst>
+        </pc:spChg>
+        <pc:picChg chg="mod">
+          <ac:chgData name="Li Lixiang" userId="6104bbfcb56aea79" providerId="LiveId" clId="{7838743D-3F48-4729-AECB-23CF92AF3D96}" dt="2021-10-04T11:09:00.786" v="146" actId="1076"/>
+          <ac:picMkLst>
+            <pc:docMk/>
+            <pc:sldMk cId="184123586" sldId="261"/>
+            <ac:picMk id="4" creationId="{F2579E6D-609C-4AEE-B118-EAEBC40BABBF}"/>
+          </ac:picMkLst>
+        </pc:picChg>
+      </pc:sldChg>
+      <pc:sldChg chg="modSp mod">
+        <pc:chgData name="Li Lixiang" userId="6104bbfcb56aea79" providerId="LiveId" clId="{7838743D-3F48-4729-AECB-23CF92AF3D96}" dt="2021-10-04T11:08:11.036" v="105" actId="20577"/>
+        <pc:sldMkLst>
+          <pc:docMk/>
+          <pc:sldMk cId="3009608438" sldId="262"/>
+        </pc:sldMkLst>
+        <pc:spChg chg="mod">
+          <ac:chgData name="Li Lixiang" userId="6104bbfcb56aea79" providerId="LiveId" clId="{7838743D-3F48-4729-AECB-23CF92AF3D96}" dt="2021-10-04T11:08:11.036" v="105" actId="20577"/>
+          <ac:spMkLst>
+            <pc:docMk/>
+            <pc:sldMk cId="3009608438" sldId="262"/>
+            <ac:spMk id="2" creationId="{5EC01E2D-9CFE-4D5D-8863-3BA90731F07B}"/>
+          </ac:spMkLst>
+        </pc:spChg>
+        <pc:spChg chg="mod">
+          <ac:chgData name="Li Lixiang" userId="6104bbfcb56aea79" providerId="LiveId" clId="{7838743D-3F48-4729-AECB-23CF92AF3D96}" dt="2021-10-04T11:06:10.995" v="74" actId="207"/>
+          <ac:spMkLst>
+            <pc:docMk/>
+            <pc:sldMk cId="3009608438" sldId="262"/>
+            <ac:spMk id="3" creationId="{7060439F-2729-478E-B95F-230482B50AA1}"/>
+          </ac:spMkLst>
+        </pc:spChg>
+        <pc:spChg chg="mod">
+          <ac:chgData name="Li Lixiang" userId="6104bbfcb56aea79" providerId="LiveId" clId="{7838743D-3F48-4729-AECB-23CF92AF3D96}" dt="2021-10-04T11:03:57.070" v="36" actId="20577"/>
+          <ac:spMkLst>
+            <pc:docMk/>
+            <pc:sldMk cId="3009608438" sldId="262"/>
+            <ac:spMk id="7" creationId="{4327E57A-852D-4800-A0B9-EF3394A82FA2}"/>
+          </ac:spMkLst>
+        </pc:spChg>
+      </pc:sldChg>
+      <pc:sldChg chg="modSp mod">
+        <pc:chgData name="Li Lixiang" userId="6104bbfcb56aea79" providerId="LiveId" clId="{7838743D-3F48-4729-AECB-23CF92AF3D96}" dt="2021-10-04T11:04:44.994" v="37" actId="207"/>
+        <pc:sldMkLst>
+          <pc:docMk/>
+          <pc:sldMk cId="3406292314" sldId="263"/>
+        </pc:sldMkLst>
+        <pc:spChg chg="mod">
+          <ac:chgData name="Li Lixiang" userId="6104bbfcb56aea79" providerId="LiveId" clId="{7838743D-3F48-4729-AECB-23CF92AF3D96}" dt="2021-10-04T11:04:44.994" v="37" actId="207"/>
+          <ac:spMkLst>
+            <pc:docMk/>
+            <pc:sldMk cId="3406292314" sldId="263"/>
+            <ac:spMk id="3" creationId="{7060439F-2729-478E-B95F-230482B50AA1}"/>
+          </ac:spMkLst>
+        </pc:spChg>
+      </pc:sldChg>
+      <pc:sldChg chg="modSp mod">
+        <pc:chgData name="Li Lixiang" userId="6104bbfcb56aea79" providerId="LiveId" clId="{7838743D-3F48-4729-AECB-23CF92AF3D96}" dt="2021-10-04T11:01:55.081" v="33" actId="20577"/>
+        <pc:sldMkLst>
+          <pc:docMk/>
+          <pc:sldMk cId="2803848671" sldId="264"/>
+        </pc:sldMkLst>
+        <pc:spChg chg="mod">
+          <ac:chgData name="Li Lixiang" userId="6104bbfcb56aea79" providerId="LiveId" clId="{7838743D-3F48-4729-AECB-23CF92AF3D96}" dt="2021-10-04T11:01:55.081" v="33" actId="20577"/>
+          <ac:spMkLst>
+            <pc:docMk/>
+            <pc:sldMk cId="2803848671" sldId="264"/>
+            <ac:spMk id="3" creationId="{7060439F-2729-478E-B95F-230482B50AA1}"/>
+          </ac:spMkLst>
+        </pc:spChg>
+      </pc:sldChg>
+      <pc:sldChg chg="addSp delSp modSp mod">
+        <pc:chgData name="Li Lixiang" userId="6104bbfcb56aea79" providerId="LiveId" clId="{7838743D-3F48-4729-AECB-23CF92AF3D96}" dt="2021-10-04T11:33:45.356" v="291" actId="21"/>
+        <pc:sldMkLst>
+          <pc:docMk/>
+          <pc:sldMk cId="3585909810" sldId="283"/>
+        </pc:sldMkLst>
+        <pc:picChg chg="add del mod">
+          <ac:chgData name="Li Lixiang" userId="6104bbfcb56aea79" providerId="LiveId" clId="{7838743D-3F48-4729-AECB-23CF92AF3D96}" dt="2021-10-04T11:33:45.356" v="291" actId="21"/>
+          <ac:picMkLst>
+            <pc:docMk/>
+            <pc:sldMk cId="3585909810" sldId="283"/>
+            <ac:picMk id="5" creationId="{2424BF27-629C-474C-B724-BEA9654B9913}"/>
+          </ac:picMkLst>
+        </pc:picChg>
+      </pc:sldChg>
+      <pc:sldChg chg="addSp delSp modSp new mod">
+        <pc:chgData name="Li Lixiang" userId="6104bbfcb56aea79" providerId="LiveId" clId="{7838743D-3F48-4729-AECB-23CF92AF3D96}" dt="2021-10-04T11:18:21.601" v="229" actId="1076"/>
+        <pc:sldMkLst>
+          <pc:docMk/>
+          <pc:sldMk cId="631023562" sldId="287"/>
+        </pc:sldMkLst>
+        <pc:spChg chg="mod">
+          <ac:chgData name="Li Lixiang" userId="6104bbfcb56aea79" providerId="LiveId" clId="{7838743D-3F48-4729-AECB-23CF92AF3D96}" dt="2021-10-04T11:14:07.631" v="222" actId="20577"/>
+          <ac:spMkLst>
+            <pc:docMk/>
+            <pc:sldMk cId="631023562" sldId="287"/>
+            <ac:spMk id="2" creationId="{F335A81E-AA9F-44E9-B48E-581ABDF8239C}"/>
+          </ac:spMkLst>
+        </pc:spChg>
+        <pc:spChg chg="del">
+          <ac:chgData name="Li Lixiang" userId="6104bbfcb56aea79" providerId="LiveId" clId="{7838743D-3F48-4729-AECB-23CF92AF3D96}" dt="2021-10-04T11:13:47.312" v="172" actId="478"/>
+          <ac:spMkLst>
+            <pc:docMk/>
+            <pc:sldMk cId="631023562" sldId="287"/>
+            <ac:spMk id="3" creationId="{3A39390D-96C6-4CEF-9155-A30AF85FB8C1}"/>
+          </ac:spMkLst>
+        </pc:spChg>
+        <pc:picChg chg="add mod">
+          <ac:chgData name="Li Lixiang" userId="6104bbfcb56aea79" providerId="LiveId" clId="{7838743D-3F48-4729-AECB-23CF92AF3D96}" dt="2021-10-04T11:14:12.202" v="223" actId="1076"/>
+          <ac:picMkLst>
+            <pc:docMk/>
+            <pc:sldMk cId="631023562" sldId="287"/>
+            <ac:picMk id="5" creationId="{A787CAAA-1A22-4BF8-83E5-3221C2BAE125}"/>
+          </ac:picMkLst>
+        </pc:picChg>
+        <pc:picChg chg="add mod">
+          <ac:chgData name="Li Lixiang" userId="6104bbfcb56aea79" providerId="LiveId" clId="{7838743D-3F48-4729-AECB-23CF92AF3D96}" dt="2021-10-04T11:15:06.374" v="225" actId="1076"/>
+          <ac:picMkLst>
+            <pc:docMk/>
+            <pc:sldMk cId="631023562" sldId="287"/>
+            <ac:picMk id="7" creationId="{525CB746-EB34-45D6-875B-CCF187C23090}"/>
+          </ac:picMkLst>
+        </pc:picChg>
+        <pc:picChg chg="add mod">
+          <ac:chgData name="Li Lixiang" userId="6104bbfcb56aea79" providerId="LiveId" clId="{7838743D-3F48-4729-AECB-23CF92AF3D96}" dt="2021-10-04T11:16:00.311" v="227" actId="1076"/>
+          <ac:picMkLst>
+            <pc:docMk/>
+            <pc:sldMk cId="631023562" sldId="287"/>
+            <ac:picMk id="9" creationId="{DF1EC4FC-9749-485B-A302-3D3B6A355870}"/>
+          </ac:picMkLst>
+        </pc:picChg>
+        <pc:picChg chg="add mod">
+          <ac:chgData name="Li Lixiang" userId="6104bbfcb56aea79" providerId="LiveId" clId="{7838743D-3F48-4729-AECB-23CF92AF3D96}" dt="2021-10-04T11:18:21.601" v="229" actId="1076"/>
+          <ac:picMkLst>
+            <pc:docMk/>
+            <pc:sldMk cId="631023562" sldId="287"/>
+            <ac:picMk id="11" creationId="{EAA3BD87-8004-43E3-AF8E-3F8822612FEA}"/>
+          </ac:picMkLst>
+        </pc:picChg>
+      </pc:sldChg>
+      <pc:sldChg chg="addSp delSp modSp new mod">
+        <pc:chgData name="Li Lixiang" userId="6104bbfcb56aea79" providerId="LiveId" clId="{7838743D-3F48-4729-AECB-23CF92AF3D96}" dt="2021-10-04T11:24:02.992" v="258" actId="1076"/>
+        <pc:sldMkLst>
+          <pc:docMk/>
+          <pc:sldMk cId="3541158414" sldId="288"/>
+        </pc:sldMkLst>
+        <pc:spChg chg="mod">
+          <ac:chgData name="Li Lixiang" userId="6104bbfcb56aea79" providerId="LiveId" clId="{7838743D-3F48-4729-AECB-23CF92AF3D96}" dt="2021-10-04T11:19:06.341" v="249"/>
+          <ac:spMkLst>
+            <pc:docMk/>
+            <pc:sldMk cId="3541158414" sldId="288"/>
+            <ac:spMk id="2" creationId="{9E887E36-295F-4613-9878-971FE784B0E3}"/>
+          </ac:spMkLst>
+        </pc:spChg>
+        <pc:spChg chg="del">
+          <ac:chgData name="Li Lixiang" userId="6104bbfcb56aea79" providerId="LiveId" clId="{7838743D-3F48-4729-AECB-23CF92AF3D96}" dt="2021-10-04T11:19:10.238" v="250" actId="478"/>
+          <ac:spMkLst>
+            <pc:docMk/>
+            <pc:sldMk cId="3541158414" sldId="288"/>
+            <ac:spMk id="3" creationId="{14355399-9C39-4891-AC83-C776CCBC8E71}"/>
+          </ac:spMkLst>
+        </pc:spChg>
+        <pc:picChg chg="add mod">
+          <ac:chgData name="Li Lixiang" userId="6104bbfcb56aea79" providerId="LiveId" clId="{7838743D-3F48-4729-AECB-23CF92AF3D96}" dt="2021-10-04T11:19:59.925" v="252" actId="1076"/>
+          <ac:picMkLst>
+            <pc:docMk/>
+            <pc:sldMk cId="3541158414" sldId="288"/>
+            <ac:picMk id="5" creationId="{787803B4-D6BF-43B7-9A29-16C707D1337D}"/>
+          </ac:picMkLst>
+        </pc:picChg>
+        <pc:picChg chg="add mod">
+          <ac:chgData name="Li Lixiang" userId="6104bbfcb56aea79" providerId="LiveId" clId="{7838743D-3F48-4729-AECB-23CF92AF3D96}" dt="2021-10-04T11:20:40.361" v="254" actId="1076"/>
+          <ac:picMkLst>
+            <pc:docMk/>
+            <pc:sldMk cId="3541158414" sldId="288"/>
+            <ac:picMk id="7" creationId="{A5AD82C1-383B-477A-8C8A-E569A37FEB92}"/>
+          </ac:picMkLst>
+        </pc:picChg>
+        <pc:picChg chg="add mod">
+          <ac:chgData name="Li Lixiang" userId="6104bbfcb56aea79" providerId="LiveId" clId="{7838743D-3F48-4729-AECB-23CF92AF3D96}" dt="2021-10-04T11:21:47.179" v="256" actId="1076"/>
+          <ac:picMkLst>
+            <pc:docMk/>
+            <pc:sldMk cId="3541158414" sldId="288"/>
+            <ac:picMk id="9" creationId="{DF73CA5C-DC63-409A-9985-FFE7C049F14D}"/>
+          </ac:picMkLst>
+        </pc:picChg>
+        <pc:picChg chg="add mod">
+          <ac:chgData name="Li Lixiang" userId="6104bbfcb56aea79" providerId="LiveId" clId="{7838743D-3F48-4729-AECB-23CF92AF3D96}" dt="2021-10-04T11:24:02.992" v="258" actId="1076"/>
+          <ac:picMkLst>
+            <pc:docMk/>
+            <pc:sldMk cId="3541158414" sldId="288"/>
+            <ac:picMk id="11" creationId="{1D8FE99C-040D-4FAC-95DB-3796A13AF008}"/>
+          </ac:picMkLst>
+        </pc:picChg>
+      </pc:sldChg>
+      <pc:sldChg chg="addSp delSp modSp new mod">
+        <pc:chgData name="Li Lixiang" userId="6104bbfcb56aea79" providerId="LiveId" clId="{7838743D-3F48-4729-AECB-23CF92AF3D96}" dt="2021-10-04T11:31:17.617" v="285" actId="1036"/>
+        <pc:sldMkLst>
+          <pc:docMk/>
+          <pc:sldMk cId="1223163485" sldId="289"/>
+        </pc:sldMkLst>
+        <pc:spChg chg="mod">
+          <ac:chgData name="Li Lixiang" userId="6104bbfcb56aea79" providerId="LiveId" clId="{7838743D-3F48-4729-AECB-23CF92AF3D96}" dt="2021-10-04T11:25:29" v="260"/>
+          <ac:spMkLst>
+            <pc:docMk/>
+            <pc:sldMk cId="1223163485" sldId="289"/>
+            <ac:spMk id="2" creationId="{FC631E2E-F185-4647-A32F-CFDBDE224151}"/>
+          </ac:spMkLst>
+        </pc:spChg>
+        <pc:spChg chg="del">
+          <ac:chgData name="Li Lixiang" userId="6104bbfcb56aea79" providerId="LiveId" clId="{7838743D-3F48-4729-AECB-23CF92AF3D96}" dt="2021-10-04T11:25:32.033" v="261" actId="478"/>
+          <ac:spMkLst>
+            <pc:docMk/>
+            <pc:sldMk cId="1223163485" sldId="289"/>
+            <ac:spMk id="3" creationId="{7740D42E-FF0B-49C1-9414-77E0EC683773}"/>
+          </ac:spMkLst>
+        </pc:spChg>
+        <pc:picChg chg="add mod">
+          <ac:chgData name="Li Lixiang" userId="6104bbfcb56aea79" providerId="LiveId" clId="{7838743D-3F48-4729-AECB-23CF92AF3D96}" dt="2021-10-04T11:26:43.103" v="263" actId="1076"/>
+          <ac:picMkLst>
+            <pc:docMk/>
+            <pc:sldMk cId="1223163485" sldId="289"/>
+            <ac:picMk id="5" creationId="{602990C9-02E1-49FB-9BF4-C0C8A9624014}"/>
+          </ac:picMkLst>
+        </pc:picChg>
+        <pc:picChg chg="add mod">
+          <ac:chgData name="Li Lixiang" userId="6104bbfcb56aea79" providerId="LiveId" clId="{7838743D-3F48-4729-AECB-23CF92AF3D96}" dt="2021-10-04T11:27:23.735" v="265" actId="1076"/>
+          <ac:picMkLst>
+            <pc:docMk/>
+            <pc:sldMk cId="1223163485" sldId="289"/>
+            <ac:picMk id="7" creationId="{76AFD806-89B6-4C66-BBAA-A4C863B2EC79}"/>
+          </ac:picMkLst>
+        </pc:picChg>
+        <pc:picChg chg="add mod">
+          <ac:chgData name="Li Lixiang" userId="6104bbfcb56aea79" providerId="LiveId" clId="{7838743D-3F48-4729-AECB-23CF92AF3D96}" dt="2021-10-04T11:28:17.759" v="267" actId="1076"/>
+          <ac:picMkLst>
+            <pc:docMk/>
+            <pc:sldMk cId="1223163485" sldId="289"/>
+            <ac:picMk id="9" creationId="{E4903C07-9B2E-4C15-A8BF-AFEA5CC6B12C}"/>
+          </ac:picMkLst>
+        </pc:picChg>
+        <pc:picChg chg="add mod">
+          <ac:chgData name="Li Lixiang" userId="6104bbfcb56aea79" providerId="LiveId" clId="{7838743D-3F48-4729-AECB-23CF92AF3D96}" dt="2021-10-04T11:29:01.819" v="269" actId="1076"/>
+          <ac:picMkLst>
+            <pc:docMk/>
+            <pc:sldMk cId="1223163485" sldId="289"/>
+            <ac:picMk id="11" creationId="{5B606AD7-37C9-414F-8794-6FE9E012D73C}"/>
+          </ac:picMkLst>
+        </pc:picChg>
+        <pc:picChg chg="add mod">
+          <ac:chgData name="Li Lixiang" userId="6104bbfcb56aea79" providerId="LiveId" clId="{7838743D-3F48-4729-AECB-23CF92AF3D96}" dt="2021-10-04T11:29:41.949" v="271" actId="1076"/>
+          <ac:picMkLst>
+            <pc:docMk/>
+            <pc:sldMk cId="1223163485" sldId="289"/>
+            <ac:picMk id="13" creationId="{2802E366-AEDA-4E62-B820-93191AC1F365}"/>
+          </ac:picMkLst>
+        </pc:picChg>
+        <pc:picChg chg="add mod">
+          <ac:chgData name="Li Lixiang" userId="6104bbfcb56aea79" providerId="LiveId" clId="{7838743D-3F48-4729-AECB-23CF92AF3D96}" dt="2021-10-04T11:30:19.918" v="273" actId="1076"/>
+          <ac:picMkLst>
+            <pc:docMk/>
+            <pc:sldMk cId="1223163485" sldId="289"/>
+            <ac:picMk id="15" creationId="{74B1D087-01B4-4FBD-BA1E-F57D10E3709F}"/>
+          </ac:picMkLst>
+        </pc:picChg>
+        <pc:picChg chg="add mod">
+          <ac:chgData name="Li Lixiang" userId="6104bbfcb56aea79" providerId="LiveId" clId="{7838743D-3F48-4729-AECB-23CF92AF3D96}" dt="2021-10-04T11:31:17.617" v="285" actId="1036"/>
+          <ac:picMkLst>
+            <pc:docMk/>
+            <pc:sldMk cId="1223163485" sldId="289"/>
+            <ac:picMk id="17" creationId="{A126AE99-91B7-47D3-8A7E-C7B80A4A910B}"/>
+          </ac:picMkLst>
+        </pc:picChg>
+      </pc:sldChg>
+      <pc:sldChg chg="addSp delSp modSp new mod">
+        <pc:chgData name="Li Lixiang" userId="6104bbfcb56aea79" providerId="LiveId" clId="{7838743D-3F48-4729-AECB-23CF92AF3D96}" dt="2021-10-04T11:40:24.383" v="313" actId="1036"/>
+        <pc:sldMkLst>
+          <pc:docMk/>
+          <pc:sldMk cId="3203192987" sldId="290"/>
+        </pc:sldMkLst>
+        <pc:spChg chg="mod">
+          <ac:chgData name="Li Lixiang" userId="6104bbfcb56aea79" providerId="LiveId" clId="{7838743D-3F48-4729-AECB-23CF92AF3D96}" dt="2021-10-04T11:31:32.570" v="287"/>
+          <ac:spMkLst>
+            <pc:docMk/>
+            <pc:sldMk cId="3203192987" sldId="290"/>
+            <ac:spMk id="2" creationId="{88F59FC4-3334-47AF-A4D0-E92189781557}"/>
+          </ac:spMkLst>
+        </pc:spChg>
+        <pc:spChg chg="del">
+          <ac:chgData name="Li Lixiang" userId="6104bbfcb56aea79" providerId="LiveId" clId="{7838743D-3F48-4729-AECB-23CF92AF3D96}" dt="2021-10-04T11:31:36.954" v="288" actId="478"/>
+          <ac:spMkLst>
+            <pc:docMk/>
+            <pc:sldMk cId="3203192987" sldId="290"/>
+            <ac:spMk id="3" creationId="{4993DDC8-D27A-44CF-8ADC-F0A114AC26DF}"/>
+          </ac:spMkLst>
+        </pc:spChg>
+        <pc:picChg chg="add mod">
+          <ac:chgData name="Li Lixiang" userId="6104bbfcb56aea79" providerId="LiveId" clId="{7838743D-3F48-4729-AECB-23CF92AF3D96}" dt="2021-10-04T11:33:49.198" v="293" actId="1076"/>
+          <ac:picMkLst>
+            <pc:docMk/>
+            <pc:sldMk cId="3203192987" sldId="290"/>
+            <ac:picMk id="4" creationId="{460570A8-AFD8-4049-8C4F-7B66029B464A}"/>
+          </ac:picMkLst>
+        </pc:picChg>
+        <pc:picChg chg="add mod">
+          <ac:chgData name="Li Lixiang" userId="6104bbfcb56aea79" providerId="LiveId" clId="{7838743D-3F48-4729-AECB-23CF92AF3D96}" dt="2021-10-04T11:34:46.846" v="295" actId="1076"/>
+          <ac:picMkLst>
+            <pc:docMk/>
+            <pc:sldMk cId="3203192987" sldId="290"/>
+            <ac:picMk id="6" creationId="{5C03394A-2278-40C4-96DD-EBFA08ABE3A6}"/>
+          </ac:picMkLst>
+        </pc:picChg>
+        <pc:picChg chg="add mod">
+          <ac:chgData name="Li Lixiang" userId="6104bbfcb56aea79" providerId="LiveId" clId="{7838743D-3F48-4729-AECB-23CF92AF3D96}" dt="2021-10-04T11:36:34.374" v="297" actId="1076"/>
+          <ac:picMkLst>
+            <pc:docMk/>
+            <pc:sldMk cId="3203192987" sldId="290"/>
+            <ac:picMk id="8" creationId="{D68E64D6-86D2-4D28-905B-9F04DAA3C0E8}"/>
+          </ac:picMkLst>
+        </pc:picChg>
+        <pc:picChg chg="add mod">
+          <ac:chgData name="Li Lixiang" userId="6104bbfcb56aea79" providerId="LiveId" clId="{7838743D-3F48-4729-AECB-23CF92AF3D96}" dt="2021-10-04T11:38:49.650" v="304" actId="1076"/>
+          <ac:picMkLst>
+            <pc:docMk/>
+            <pc:sldMk cId="3203192987" sldId="290"/>
+            <ac:picMk id="10" creationId="{5F92C1B3-B050-4E79-B464-D4589B0CA201}"/>
+          </ac:picMkLst>
+        </pc:picChg>
+        <pc:picChg chg="add mod">
+          <ac:chgData name="Li Lixiang" userId="6104bbfcb56aea79" providerId="LiveId" clId="{7838743D-3F48-4729-AECB-23CF92AF3D96}" dt="2021-10-04T11:38:47.781" v="303" actId="1076"/>
+          <ac:picMkLst>
+            <pc:docMk/>
+            <pc:sldMk cId="3203192987" sldId="290"/>
+            <ac:picMk id="12" creationId="{93031F4B-2664-4D0F-B514-723CAF020D16}"/>
+          </ac:picMkLst>
+        </pc:picChg>
+        <pc:picChg chg="add mod">
+          <ac:chgData name="Li Lixiang" userId="6104bbfcb56aea79" providerId="LiveId" clId="{7838743D-3F48-4729-AECB-23CF92AF3D96}" dt="2021-10-04T11:39:25.711" v="306" actId="1076"/>
+          <ac:picMkLst>
+            <pc:docMk/>
+            <pc:sldMk cId="3203192987" sldId="290"/>
+            <ac:picMk id="14" creationId="{96F25BB0-EB4F-46CE-A264-1FE8614A7B49}"/>
+          </ac:picMkLst>
+        </pc:picChg>
+        <pc:picChg chg="add mod">
+          <ac:chgData name="Li Lixiang" userId="6104bbfcb56aea79" providerId="LiveId" clId="{7838743D-3F48-4729-AECB-23CF92AF3D96}" dt="2021-10-04T11:40:24.383" v="313" actId="1036"/>
+          <ac:picMkLst>
+            <pc:docMk/>
+            <pc:sldMk cId="3203192987" sldId="290"/>
+            <ac:picMk id="16" creationId="{860072E4-774E-423A-925B-574537AA164C}"/>
+          </ac:picMkLst>
+        </pc:picChg>
+      </pc:sldChg>
+    </pc:docChg>
+  </pc:docChgLst>
   <pc:docChgLst>
     <pc:chgData name="Li Lixiang" userId="6104bbfcb56aea79" providerId="LiveId" clId="{3CEBFCD4-4755-48CE-84C1-D9794E770E0E}"/>
     <pc:docChg chg="custSel addSld delSld modSld sldOrd">
@@ -2092,30 +2551,6 @@
           <ac:spMkLst>
             <pc:docMk/>
             <pc:sldMk cId="184123586" sldId="261"/>
-            <ac:spMk id="3" creationId="{7060439F-2729-478E-B95F-230482B50AA1}"/>
-          </ac:spMkLst>
-        </pc:spChg>
-      </pc:sldChg>
-    </pc:docChg>
-  </pc:docChgLst>
-  <pc:docChgLst>
-    <pc:chgData name="Li Lixiang" userId="6104bbfcb56aea79" providerId="LiveId" clId="{23F611FF-0BB3-4599-A6B3-EA82A2B7F99F}"/>
-    <pc:docChg chg="modSld">
-      <pc:chgData name="Li Lixiang" userId="6104bbfcb56aea79" providerId="LiveId" clId="{23F611FF-0BB3-4599-A6B3-EA82A2B7F99F}" dt="2021-08-08T03:13:19.414" v="0" actId="14100"/>
-      <pc:docMkLst>
-        <pc:docMk/>
-      </pc:docMkLst>
-      <pc:sldChg chg="modSp mod">
-        <pc:chgData name="Li Lixiang" userId="6104bbfcb56aea79" providerId="LiveId" clId="{23F611FF-0BB3-4599-A6B3-EA82A2B7F99F}" dt="2021-08-08T03:13:19.414" v="0" actId="14100"/>
-        <pc:sldMkLst>
-          <pc:docMk/>
-          <pc:sldMk cId="3585909810" sldId="283"/>
-        </pc:sldMkLst>
-        <pc:spChg chg="mod">
-          <ac:chgData name="Li Lixiang" userId="6104bbfcb56aea79" providerId="LiveId" clId="{23F611FF-0BB3-4599-A6B3-EA82A2B7F99F}" dt="2021-08-08T03:13:19.414" v="0" actId="14100"/>
-          <ac:spMkLst>
-            <pc:docMk/>
-            <pc:sldMk cId="3585909810" sldId="283"/>
             <ac:spMk id="3" creationId="{7060439F-2729-478E-B95F-230482B50AA1}"/>
           </ac:spMkLst>
         </pc:spChg>
@@ -2448,7 +2883,7 @@
             <a:fld id="{B61BEF0D-F0BB-DE4B-95CE-6DB70DBA9567}" type="datetimeFigureOut">
               <a:rPr lang="en-US" smtClean="0"/>
               <a:pPr/>
-              <a:t>8/8/2021</a:t>
+              <a:t>10/4/2021</a:t>
             </a:fld>
             <a:endParaRPr lang="en-US" dirty="0"/>
           </a:p>
@@ -2784,7 +3219,7 @@
             <a:fld id="{B61BEF0D-F0BB-DE4B-95CE-6DB70DBA9567}" type="datetimeFigureOut">
               <a:rPr lang="en-US" smtClean="0"/>
               <a:pPr/>
-              <a:t>8/8/2021</a:t>
+              <a:t>10/4/2021</a:t>
             </a:fld>
             <a:endParaRPr lang="en-US" dirty="0"/>
           </a:p>
@@ -3064,7 +3499,7 @@
             <a:fld id="{B61BEF0D-F0BB-DE4B-95CE-6DB70DBA9567}" type="datetimeFigureOut">
               <a:rPr lang="en-US" smtClean="0"/>
               <a:pPr/>
-              <a:t>8/8/2021</a:t>
+              <a:t>10/4/2021</a:t>
             </a:fld>
             <a:endParaRPr lang="en-US" dirty="0"/>
           </a:p>
@@ -3634,7 +4069,7 @@
             <a:fld id="{B61BEF0D-F0BB-DE4B-95CE-6DB70DBA9567}" type="datetimeFigureOut">
               <a:rPr lang="en-US" smtClean="0"/>
               <a:pPr/>
-              <a:t>8/8/2021</a:t>
+              <a:t>10/4/2021</a:t>
             </a:fld>
             <a:endParaRPr lang="en-US" dirty="0"/>
           </a:p>
@@ -3914,7 +4349,7 @@
             <a:fld id="{B61BEF0D-F0BB-DE4B-95CE-6DB70DBA9567}" type="datetimeFigureOut">
               <a:rPr lang="en-US" smtClean="0"/>
               <a:pPr/>
-              <a:t>8/8/2021</a:t>
+              <a:t>10/4/2021</a:t>
             </a:fld>
             <a:endParaRPr lang="en-US" dirty="0"/>
           </a:p>
@@ -4478,7 +4913,7 @@
             <a:fld id="{B61BEF0D-F0BB-DE4B-95CE-6DB70DBA9567}" type="datetimeFigureOut">
               <a:rPr lang="en-US" smtClean="0"/>
               <a:pPr/>
-              <a:t>8/8/2021</a:t>
+              <a:t>10/4/2021</a:t>
             </a:fld>
             <a:endParaRPr lang="en-US" dirty="0"/>
           </a:p>
@@ -4807,7 +5242,7 @@
             <a:fld id="{B61BEF0D-F0BB-DE4B-95CE-6DB70DBA9567}" type="datetimeFigureOut">
               <a:rPr lang="en-US" smtClean="0"/>
               <a:pPr/>
-              <a:t>8/8/2021</a:t>
+              <a:t>10/4/2021</a:t>
             </a:fld>
             <a:endParaRPr lang="en-US" dirty="0"/>
           </a:p>
@@ -4986,7 +5421,7 @@
             <a:fld id="{B61BEF0D-F0BB-DE4B-95CE-6DB70DBA9567}" type="datetimeFigureOut">
               <a:rPr lang="en-US" smtClean="0"/>
               <a:pPr/>
-              <a:t>8/8/2021</a:t>
+              <a:t>10/4/2021</a:t>
             </a:fld>
             <a:endParaRPr lang="en-US" dirty="0"/>
           </a:p>
@@ -5226,7 +5661,7 @@
             <a:fld id="{B61BEF0D-F0BB-DE4B-95CE-6DB70DBA9567}" type="datetimeFigureOut">
               <a:rPr lang="en-US" smtClean="0"/>
               <a:pPr/>
-              <a:t>8/8/2021</a:t>
+              <a:t>10/4/2021</a:t>
             </a:fld>
             <a:endParaRPr lang="en-US" dirty="0"/>
           </a:p>
@@ -5428,7 +5863,7 @@
             <a:fld id="{B61BEF0D-F0BB-DE4B-95CE-6DB70DBA9567}" type="datetimeFigureOut">
               <a:rPr lang="en-US" smtClean="0"/>
               <a:pPr/>
-              <a:t>8/8/2021</a:t>
+              <a:t>10/4/2021</a:t>
             </a:fld>
             <a:endParaRPr lang="en-US" dirty="0"/>
           </a:p>
@@ -5706,7 +6141,7 @@
             <a:fld id="{B61BEF0D-F0BB-DE4B-95CE-6DB70DBA9567}" type="datetimeFigureOut">
               <a:rPr lang="en-US" smtClean="0"/>
               <a:pPr/>
-              <a:t>8/8/2021</a:t>
+              <a:t>10/4/2021</a:t>
             </a:fld>
             <a:endParaRPr lang="en-US" dirty="0"/>
           </a:p>
@@ -5974,7 +6409,7 @@
             <a:fld id="{B61BEF0D-F0BB-DE4B-95CE-6DB70DBA9567}" type="datetimeFigureOut">
               <a:rPr lang="en-US" smtClean="0"/>
               <a:pPr/>
-              <a:t>8/8/2021</a:t>
+              <a:t>10/4/2021</a:t>
             </a:fld>
             <a:endParaRPr lang="en-US" dirty="0"/>
           </a:p>
@@ -6350,7 +6785,7 @@
             <a:fld id="{B61BEF0D-F0BB-DE4B-95CE-6DB70DBA9567}" type="datetimeFigureOut">
               <a:rPr lang="en-US" smtClean="0"/>
               <a:pPr/>
-              <a:t>8/8/2021</a:t>
+              <a:t>10/4/2021</a:t>
             </a:fld>
             <a:endParaRPr lang="en-US" dirty="0"/>
           </a:p>
@@ -6500,7 +6935,7 @@
             <a:fld id="{B61BEF0D-F0BB-DE4B-95CE-6DB70DBA9567}" type="datetimeFigureOut">
               <a:rPr lang="en-US" smtClean="0"/>
               <a:pPr/>
-              <a:t>8/8/2021</a:t>
+              <a:t>10/4/2021</a:t>
             </a:fld>
             <a:endParaRPr lang="en-US" dirty="0"/>
           </a:p>
@@ -6627,7 +7062,7 @@
             <a:fld id="{B61BEF0D-F0BB-DE4B-95CE-6DB70DBA9567}" type="datetimeFigureOut">
               <a:rPr lang="en-US" smtClean="0"/>
               <a:pPr/>
-              <a:t>8/8/2021</a:t>
+              <a:t>10/4/2021</a:t>
             </a:fld>
             <a:endParaRPr lang="en-US" dirty="0"/>
           </a:p>
@@ -6914,7 +7349,7 @@
             <a:fld id="{B61BEF0D-F0BB-DE4B-95CE-6DB70DBA9567}" type="datetimeFigureOut">
               <a:rPr lang="en-US" smtClean="0"/>
               <a:pPr/>
-              <a:t>8/8/2021</a:t>
+              <a:t>10/4/2021</a:t>
             </a:fld>
             <a:endParaRPr lang="en-US" dirty="0"/>
           </a:p>
@@ -7240,7 +7675,7 @@
             <a:fld id="{B61BEF0D-F0BB-DE4B-95CE-6DB70DBA9567}" type="datetimeFigureOut">
               <a:rPr lang="en-US" smtClean="0"/>
               <a:pPr/>
-              <a:t>8/8/2021</a:t>
+              <a:t>10/4/2021</a:t>
             </a:fld>
             <a:endParaRPr lang="en-US" dirty="0"/>
           </a:p>
@@ -7456,7 +7891,7 @@
             <a:fld id="{B61BEF0D-F0BB-DE4B-95CE-6DB70DBA9567}" type="datetimeFigureOut">
               <a:rPr lang="en-US" smtClean="0"/>
               <a:pPr/>
-              <a:t>8/8/2021</a:t>
+              <a:t>10/4/2021</a:t>
             </a:fld>
             <a:endParaRPr lang="en-US" dirty="0"/>
           </a:p>
@@ -8059,6 +8494,185 @@
       </p:grpSpPr>
       <p:sp>
         <p:nvSpPr>
+          <p:cNvPr id="2" name="Title 1">
+            <a:extLst>
+              <a:ext uri="{FF2B5EF4-FFF2-40B4-BE49-F238E27FC236}">
+                <a16:creationId xmlns:a16="http://schemas.microsoft.com/office/drawing/2014/main" id="{F335A81E-AA9F-44E9-B48E-581ABDF8239C}"/>
+              </a:ext>
+            </a:extLst>
+          </p:cNvPr>
+          <p:cNvSpPr>
+            <a:spLocks noGrp="1"/>
+          </p:cNvSpPr>
+          <p:nvPr>
+            <p:ph type="title"/>
+          </p:nvPr>
+        </p:nvSpPr>
+        <p:spPr/>
+        <p:txBody>
+          <a:bodyPr/>
+          <a:lstStyle/>
+          <a:p>
+            <a:r>
+              <a:rPr lang="en-US" dirty="0"/>
+              <a:t>In class practice: what is the result for those code?</a:t>
+            </a:r>
+            <a:endParaRPr lang="en-MY" dirty="0"/>
+          </a:p>
+        </p:txBody>
+      </p:sp>
+      <p:pic>
+        <p:nvPicPr>
+          <p:cNvPr id="5" name="Picture 4">
+            <a:extLst>
+              <a:ext uri="{FF2B5EF4-FFF2-40B4-BE49-F238E27FC236}">
+                <a16:creationId xmlns:a16="http://schemas.microsoft.com/office/drawing/2014/main" id="{A787CAAA-1A22-4BF8-83E5-3221C2BAE125}"/>
+              </a:ext>
+            </a:extLst>
+          </p:cNvPr>
+          <p:cNvPicPr>
+            <a:picLocks noChangeAspect="1"/>
+          </p:cNvPicPr>
+          <p:nvPr/>
+        </p:nvPicPr>
+        <p:blipFill>
+          <a:blip r:embed="rId2"/>
+          <a:stretch>
+            <a:fillRect/>
+          </a:stretch>
+        </p:blipFill>
+        <p:spPr>
+          <a:xfrm>
+            <a:off x="1496541" y="2449407"/>
+            <a:ext cx="1552792" cy="200053"/>
+          </a:xfrm>
+          <a:prstGeom prst="rect">
+            <a:avLst/>
+          </a:prstGeom>
+        </p:spPr>
+      </p:pic>
+      <p:pic>
+        <p:nvPicPr>
+          <p:cNvPr id="7" name="Picture 6">
+            <a:extLst>
+              <a:ext uri="{FF2B5EF4-FFF2-40B4-BE49-F238E27FC236}">
+                <a16:creationId xmlns:a16="http://schemas.microsoft.com/office/drawing/2014/main" id="{525CB746-EB34-45D6-875B-CCF187C23090}"/>
+              </a:ext>
+            </a:extLst>
+          </p:cNvPr>
+          <p:cNvPicPr>
+            <a:picLocks noChangeAspect="1"/>
+          </p:cNvPicPr>
+          <p:nvPr/>
+        </p:nvPicPr>
+        <p:blipFill>
+          <a:blip r:embed="rId3"/>
+          <a:stretch>
+            <a:fillRect/>
+          </a:stretch>
+        </p:blipFill>
+        <p:spPr>
+          <a:xfrm>
+            <a:off x="1496541" y="3383280"/>
+            <a:ext cx="1562318" cy="371527"/>
+          </a:xfrm>
+          <a:prstGeom prst="rect">
+            <a:avLst/>
+          </a:prstGeom>
+        </p:spPr>
+      </p:pic>
+      <p:pic>
+        <p:nvPicPr>
+          <p:cNvPr id="9" name="Picture 8">
+            <a:extLst>
+              <a:ext uri="{FF2B5EF4-FFF2-40B4-BE49-F238E27FC236}">
+                <a16:creationId xmlns:a16="http://schemas.microsoft.com/office/drawing/2014/main" id="{DF1EC4FC-9749-485B-A302-3D3B6A355870}"/>
+              </a:ext>
+            </a:extLst>
+          </p:cNvPr>
+          <p:cNvPicPr>
+            <a:picLocks noChangeAspect="1"/>
+          </p:cNvPicPr>
+          <p:nvPr/>
+        </p:nvPicPr>
+        <p:blipFill>
+          <a:blip r:embed="rId4"/>
+          <a:stretch>
+            <a:fillRect/>
+          </a:stretch>
+        </p:blipFill>
+        <p:spPr>
+          <a:xfrm>
+            <a:off x="1496541" y="4488627"/>
+            <a:ext cx="2172003" cy="390580"/>
+          </a:xfrm>
+          <a:prstGeom prst="rect">
+            <a:avLst/>
+          </a:prstGeom>
+        </p:spPr>
+      </p:pic>
+      <p:pic>
+        <p:nvPicPr>
+          <p:cNvPr id="11" name="Picture 10">
+            <a:extLst>
+              <a:ext uri="{FF2B5EF4-FFF2-40B4-BE49-F238E27FC236}">
+                <a16:creationId xmlns:a16="http://schemas.microsoft.com/office/drawing/2014/main" id="{EAA3BD87-8004-43E3-AF8E-3F8822612FEA}"/>
+              </a:ext>
+            </a:extLst>
+          </p:cNvPr>
+          <p:cNvPicPr>
+            <a:picLocks noChangeAspect="1"/>
+          </p:cNvPicPr>
+          <p:nvPr/>
+        </p:nvPicPr>
+        <p:blipFill>
+          <a:blip r:embed="rId5"/>
+          <a:stretch>
+            <a:fillRect/>
+          </a:stretch>
+        </p:blipFill>
+        <p:spPr>
+          <a:xfrm>
+            <a:off x="5915259" y="2363670"/>
+            <a:ext cx="2486372" cy="571580"/>
+          </a:xfrm>
+          <a:prstGeom prst="rect">
+            <a:avLst/>
+          </a:prstGeom>
+        </p:spPr>
+      </p:pic>
+    </p:spTree>
+    <p:extLst>
+      <p:ext uri="{BB962C8B-B14F-4D97-AF65-F5344CB8AC3E}">
+        <p14:creationId xmlns:p14="http://schemas.microsoft.com/office/powerpoint/2010/main" val="631023562"/>
+      </p:ext>
+    </p:extLst>
+  </p:cSld>
+  <p:clrMapOvr>
+    <a:masterClrMapping/>
+  </p:clrMapOvr>
+</p:sld>
+</file>
+
+<file path=ppt/slides/slide11.xml><?xml version="1.0" encoding="utf-8"?>
+<p:sld xmlns:a="http://schemas.openxmlformats.org/drawingml/2006/main" xmlns:r="http://schemas.openxmlformats.org/officeDocument/2006/relationships" xmlns:p="http://schemas.openxmlformats.org/presentationml/2006/main">
+  <p:cSld>
+    <p:spTree>
+      <p:nvGrpSpPr>
+        <p:cNvPr id="1" name=""/>
+        <p:cNvGrpSpPr/>
+        <p:nvPr/>
+      </p:nvGrpSpPr>
+      <p:grpSpPr>
+        <a:xfrm>
+          <a:off x="0" y="0"/>
+          <a:ext cx="0" cy="0"/>
+          <a:chOff x="0" y="0"/>
+          <a:chExt cx="0" cy="0"/>
+        </a:xfrm>
+      </p:grpSpPr>
+      <p:sp>
+        <p:nvSpPr>
           <p:cNvPr id="2" name="标题 1">
             <a:extLst>
               <a:ext uri="{FF2B5EF4-FFF2-40B4-BE49-F238E27FC236}">
@@ -8145,14 +8759,14 @@
             <a:pPr lvl="1"/>
             <a:r>
               <a:rPr lang="en-MY" sz="1800" dirty="0"/>
-              <a:t>when one operand is float, the other one if is integer or bool will be converted to float</a:t>
+              <a:t>when one operand is float, the other one is integer or bool, it will be converted to float</a:t>
             </a:r>
           </a:p>
           <a:p>
             <a:pPr lvl="1"/>
             <a:r>
               <a:rPr lang="en-MY" sz="1800" dirty="0"/>
-              <a:t>when one operand is integer, the other on if is bool will be converted to integer</a:t>
+              <a:t>when one operand is integer, the other one is bool, it will be converted to integer</a:t>
             </a:r>
           </a:p>
           <a:p>
@@ -8279,7 +8893,186 @@
 </p:sld>
 </file>
 
-<file path=ppt/slides/slide11.xml><?xml version="1.0" encoding="utf-8"?>
+<file path=ppt/slides/slide12.xml><?xml version="1.0" encoding="utf-8"?>
+<p:sld xmlns:a="http://schemas.openxmlformats.org/drawingml/2006/main" xmlns:r="http://schemas.openxmlformats.org/officeDocument/2006/relationships" xmlns:p="http://schemas.openxmlformats.org/presentationml/2006/main">
+  <p:cSld>
+    <p:spTree>
+      <p:nvGrpSpPr>
+        <p:cNvPr id="1" name=""/>
+        <p:cNvGrpSpPr/>
+        <p:nvPr/>
+      </p:nvGrpSpPr>
+      <p:grpSpPr>
+        <a:xfrm>
+          <a:off x="0" y="0"/>
+          <a:ext cx="0" cy="0"/>
+          <a:chOff x="0" y="0"/>
+          <a:chExt cx="0" cy="0"/>
+        </a:xfrm>
+      </p:grpSpPr>
+      <p:sp>
+        <p:nvSpPr>
+          <p:cNvPr id="2" name="Title 1">
+            <a:extLst>
+              <a:ext uri="{FF2B5EF4-FFF2-40B4-BE49-F238E27FC236}">
+                <a16:creationId xmlns:a16="http://schemas.microsoft.com/office/drawing/2014/main" id="{9E887E36-295F-4613-9878-971FE784B0E3}"/>
+              </a:ext>
+            </a:extLst>
+          </p:cNvPr>
+          <p:cNvSpPr>
+            <a:spLocks noGrp="1"/>
+          </p:cNvSpPr>
+          <p:nvPr>
+            <p:ph type="title"/>
+          </p:nvPr>
+        </p:nvSpPr>
+        <p:spPr/>
+        <p:txBody>
+          <a:bodyPr/>
+          <a:lstStyle/>
+          <a:p>
+            <a:r>
+              <a:rPr lang="en-US" dirty="0"/>
+              <a:t>In class practice : what is the result for those code?</a:t>
+            </a:r>
+            <a:endParaRPr lang="en-MY" dirty="0"/>
+          </a:p>
+        </p:txBody>
+      </p:sp>
+      <p:pic>
+        <p:nvPicPr>
+          <p:cNvPr id="5" name="Picture 4">
+            <a:extLst>
+              <a:ext uri="{FF2B5EF4-FFF2-40B4-BE49-F238E27FC236}">
+                <a16:creationId xmlns:a16="http://schemas.microsoft.com/office/drawing/2014/main" id="{787803B4-D6BF-43B7-9A29-16C707D1337D}"/>
+              </a:ext>
+            </a:extLst>
+          </p:cNvPr>
+          <p:cNvPicPr>
+            <a:picLocks noChangeAspect="1"/>
+          </p:cNvPicPr>
+          <p:nvPr/>
+        </p:nvPicPr>
+        <p:blipFill>
+          <a:blip r:embed="rId2"/>
+          <a:stretch>
+            <a:fillRect/>
+          </a:stretch>
+        </p:blipFill>
+        <p:spPr>
+          <a:xfrm>
+            <a:off x="1690052" y="2157362"/>
+            <a:ext cx="1305107" cy="714475"/>
+          </a:xfrm>
+          <a:prstGeom prst="rect">
+            <a:avLst/>
+          </a:prstGeom>
+        </p:spPr>
+      </p:pic>
+      <p:pic>
+        <p:nvPicPr>
+          <p:cNvPr id="7" name="Picture 6">
+            <a:extLst>
+              <a:ext uri="{FF2B5EF4-FFF2-40B4-BE49-F238E27FC236}">
+                <a16:creationId xmlns:a16="http://schemas.microsoft.com/office/drawing/2014/main" id="{A5AD82C1-383B-477A-8C8A-E569A37FEB92}"/>
+              </a:ext>
+            </a:extLst>
+          </p:cNvPr>
+          <p:cNvPicPr>
+            <a:picLocks noChangeAspect="1"/>
+          </p:cNvPicPr>
+          <p:nvPr/>
+        </p:nvPicPr>
+        <p:blipFill>
+          <a:blip r:embed="rId3"/>
+          <a:stretch>
+            <a:fillRect/>
+          </a:stretch>
+        </p:blipFill>
+        <p:spPr>
+          <a:xfrm>
+            <a:off x="1713867" y="3888489"/>
+            <a:ext cx="1257475" cy="352474"/>
+          </a:xfrm>
+          <a:prstGeom prst="rect">
+            <a:avLst/>
+          </a:prstGeom>
+        </p:spPr>
+      </p:pic>
+      <p:pic>
+        <p:nvPicPr>
+          <p:cNvPr id="9" name="Picture 8">
+            <a:extLst>
+              <a:ext uri="{FF2B5EF4-FFF2-40B4-BE49-F238E27FC236}">
+                <a16:creationId xmlns:a16="http://schemas.microsoft.com/office/drawing/2014/main" id="{DF73CA5C-DC63-409A-9985-FFE7C049F14D}"/>
+              </a:ext>
+            </a:extLst>
+          </p:cNvPr>
+          <p:cNvPicPr>
+            <a:picLocks noChangeAspect="1"/>
+          </p:cNvPicPr>
+          <p:nvPr/>
+        </p:nvPicPr>
+        <p:blipFill>
+          <a:blip r:embed="rId4"/>
+          <a:stretch>
+            <a:fillRect/>
+          </a:stretch>
+        </p:blipFill>
+        <p:spPr>
+          <a:xfrm>
+            <a:off x="4933586" y="2162125"/>
+            <a:ext cx="1314633" cy="352474"/>
+          </a:xfrm>
+          <a:prstGeom prst="rect">
+            <a:avLst/>
+          </a:prstGeom>
+        </p:spPr>
+      </p:pic>
+      <p:pic>
+        <p:nvPicPr>
+          <p:cNvPr id="11" name="Picture 10">
+            <a:extLst>
+              <a:ext uri="{FF2B5EF4-FFF2-40B4-BE49-F238E27FC236}">
+                <a16:creationId xmlns:a16="http://schemas.microsoft.com/office/drawing/2014/main" id="{1D8FE99C-040D-4FAC-95DB-3796A13AF008}"/>
+              </a:ext>
+            </a:extLst>
+          </p:cNvPr>
+          <p:cNvPicPr>
+            <a:picLocks noChangeAspect="1"/>
+          </p:cNvPicPr>
+          <p:nvPr/>
+        </p:nvPicPr>
+        <p:blipFill>
+          <a:blip r:embed="rId5"/>
+          <a:stretch>
+            <a:fillRect/>
+          </a:stretch>
+        </p:blipFill>
+        <p:spPr>
+          <a:xfrm>
+            <a:off x="4933586" y="3948907"/>
+            <a:ext cx="1305107" cy="333422"/>
+          </a:xfrm>
+          <a:prstGeom prst="rect">
+            <a:avLst/>
+          </a:prstGeom>
+        </p:spPr>
+      </p:pic>
+    </p:spTree>
+    <p:extLst>
+      <p:ext uri="{BB962C8B-B14F-4D97-AF65-F5344CB8AC3E}">
+        <p14:creationId xmlns:p14="http://schemas.microsoft.com/office/powerpoint/2010/main" val="3541158414"/>
+      </p:ext>
+    </p:extLst>
+  </p:cSld>
+  <p:clrMapOvr>
+    <a:masterClrMapping/>
+  </p:clrMapOvr>
+</p:sld>
+</file>
+
+<file path=ppt/slides/slide13.xml><?xml version="1.0" encoding="utf-8"?>
 <p:sld xmlns:a="http://schemas.openxmlformats.org/drawingml/2006/main" xmlns:r="http://schemas.openxmlformats.org/officeDocument/2006/relationships" xmlns:p="http://schemas.openxmlformats.org/presentationml/2006/main">
   <p:cSld>
     <p:spTree>
@@ -8424,7 +9217,7 @@
 </p:sld>
 </file>
 
-<file path=ppt/slides/slide12.xml><?xml version="1.0" encoding="utf-8"?>
+<file path=ppt/slides/slide14.xml><?xml version="1.0" encoding="utf-8"?>
 <p:sld xmlns:a="http://schemas.openxmlformats.org/drawingml/2006/main" xmlns:r="http://schemas.openxmlformats.org/officeDocument/2006/relationships" xmlns:p="http://schemas.openxmlformats.org/presentationml/2006/main">
   <p:cSld>
     <p:spTree>
@@ -8553,7 +9346,276 @@
 </p:sld>
 </file>
 
-<file path=ppt/slides/slide13.xml><?xml version="1.0" encoding="utf-8"?>
+<file path=ppt/slides/slide15.xml><?xml version="1.0" encoding="utf-8"?>
+<p:sld xmlns:a="http://schemas.openxmlformats.org/drawingml/2006/main" xmlns:r="http://schemas.openxmlformats.org/officeDocument/2006/relationships" xmlns:p="http://schemas.openxmlformats.org/presentationml/2006/main">
+  <p:cSld>
+    <p:spTree>
+      <p:nvGrpSpPr>
+        <p:cNvPr id="1" name=""/>
+        <p:cNvGrpSpPr/>
+        <p:nvPr/>
+      </p:nvGrpSpPr>
+      <p:grpSpPr>
+        <a:xfrm>
+          <a:off x="0" y="0"/>
+          <a:ext cx="0" cy="0"/>
+          <a:chOff x="0" y="0"/>
+          <a:chExt cx="0" cy="0"/>
+        </a:xfrm>
+      </p:grpSpPr>
+      <p:sp>
+        <p:nvSpPr>
+          <p:cNvPr id="2" name="Title 1">
+            <a:extLst>
+              <a:ext uri="{FF2B5EF4-FFF2-40B4-BE49-F238E27FC236}">
+                <a16:creationId xmlns:a16="http://schemas.microsoft.com/office/drawing/2014/main" id="{FC631E2E-F185-4647-A32F-CFDBDE224151}"/>
+              </a:ext>
+            </a:extLst>
+          </p:cNvPr>
+          <p:cNvSpPr>
+            <a:spLocks noGrp="1"/>
+          </p:cNvSpPr>
+          <p:nvPr>
+            <p:ph type="title"/>
+          </p:nvPr>
+        </p:nvSpPr>
+        <p:spPr/>
+        <p:txBody>
+          <a:bodyPr/>
+          <a:lstStyle/>
+          <a:p>
+            <a:r>
+              <a:rPr lang="en-US" dirty="0"/>
+              <a:t>In class practice : what is the result for those code?</a:t>
+            </a:r>
+            <a:endParaRPr lang="en-MY" dirty="0"/>
+          </a:p>
+        </p:txBody>
+      </p:sp>
+      <p:pic>
+        <p:nvPicPr>
+          <p:cNvPr id="5" name="Picture 4">
+            <a:extLst>
+              <a:ext uri="{FF2B5EF4-FFF2-40B4-BE49-F238E27FC236}">
+                <a16:creationId xmlns:a16="http://schemas.microsoft.com/office/drawing/2014/main" id="{602990C9-02E1-49FB-9BF4-C0C8A9624014}"/>
+              </a:ext>
+            </a:extLst>
+          </p:cNvPr>
+          <p:cNvPicPr>
+            <a:picLocks noChangeAspect="1"/>
+          </p:cNvPicPr>
+          <p:nvPr/>
+        </p:nvPicPr>
+        <p:blipFill>
+          <a:blip r:embed="rId2"/>
+          <a:stretch>
+            <a:fillRect/>
+          </a:stretch>
+        </p:blipFill>
+        <p:spPr>
+          <a:xfrm>
+            <a:off x="1470559" y="2339324"/>
+            <a:ext cx="1448002" cy="228632"/>
+          </a:xfrm>
+          <a:prstGeom prst="rect">
+            <a:avLst/>
+          </a:prstGeom>
+        </p:spPr>
+      </p:pic>
+      <p:pic>
+        <p:nvPicPr>
+          <p:cNvPr id="7" name="Picture 6">
+            <a:extLst>
+              <a:ext uri="{FF2B5EF4-FFF2-40B4-BE49-F238E27FC236}">
+                <a16:creationId xmlns:a16="http://schemas.microsoft.com/office/drawing/2014/main" id="{76AFD806-89B6-4C66-BBAA-A4C863B2EC79}"/>
+              </a:ext>
+            </a:extLst>
+          </p:cNvPr>
+          <p:cNvPicPr>
+            <a:picLocks noChangeAspect="1"/>
+          </p:cNvPicPr>
+          <p:nvPr/>
+        </p:nvPicPr>
+        <p:blipFill>
+          <a:blip r:embed="rId3"/>
+          <a:stretch>
+            <a:fillRect/>
+          </a:stretch>
+        </p:blipFill>
+        <p:spPr>
+          <a:xfrm>
+            <a:off x="1470559" y="3429000"/>
+            <a:ext cx="1562318" cy="181000"/>
+          </a:xfrm>
+          <a:prstGeom prst="rect">
+            <a:avLst/>
+          </a:prstGeom>
+        </p:spPr>
+      </p:pic>
+      <p:pic>
+        <p:nvPicPr>
+          <p:cNvPr id="9" name="Picture 8">
+            <a:extLst>
+              <a:ext uri="{FF2B5EF4-FFF2-40B4-BE49-F238E27FC236}">
+                <a16:creationId xmlns:a16="http://schemas.microsoft.com/office/drawing/2014/main" id="{E4903C07-9B2E-4C15-A8BF-AFEA5CC6B12C}"/>
+              </a:ext>
+            </a:extLst>
+          </p:cNvPr>
+          <p:cNvPicPr>
+            <a:picLocks noChangeAspect="1"/>
+          </p:cNvPicPr>
+          <p:nvPr/>
+        </p:nvPicPr>
+        <p:blipFill>
+          <a:blip r:embed="rId4"/>
+          <a:stretch>
+            <a:fillRect/>
+          </a:stretch>
+        </p:blipFill>
+        <p:spPr>
+          <a:xfrm>
+            <a:off x="4229970" y="2339324"/>
+            <a:ext cx="1171739" cy="362001"/>
+          </a:xfrm>
+          <a:prstGeom prst="rect">
+            <a:avLst/>
+          </a:prstGeom>
+        </p:spPr>
+      </p:pic>
+      <p:pic>
+        <p:nvPicPr>
+          <p:cNvPr id="11" name="Picture 10">
+            <a:extLst>
+              <a:ext uri="{FF2B5EF4-FFF2-40B4-BE49-F238E27FC236}">
+                <a16:creationId xmlns:a16="http://schemas.microsoft.com/office/drawing/2014/main" id="{5B606AD7-37C9-414F-8794-6FE9E012D73C}"/>
+              </a:ext>
+            </a:extLst>
+          </p:cNvPr>
+          <p:cNvPicPr>
+            <a:picLocks noChangeAspect="1"/>
+          </p:cNvPicPr>
+          <p:nvPr/>
+        </p:nvPicPr>
+        <p:blipFill>
+          <a:blip r:embed="rId5"/>
+          <a:stretch>
+            <a:fillRect/>
+          </a:stretch>
+        </p:blipFill>
+        <p:spPr>
+          <a:xfrm>
+            <a:off x="4229970" y="3348026"/>
+            <a:ext cx="1286054" cy="342948"/>
+          </a:xfrm>
+          <a:prstGeom prst="rect">
+            <a:avLst/>
+          </a:prstGeom>
+        </p:spPr>
+      </p:pic>
+      <p:pic>
+        <p:nvPicPr>
+          <p:cNvPr id="13" name="Picture 12">
+            <a:extLst>
+              <a:ext uri="{FF2B5EF4-FFF2-40B4-BE49-F238E27FC236}">
+                <a16:creationId xmlns:a16="http://schemas.microsoft.com/office/drawing/2014/main" id="{2802E366-AEDA-4E62-B820-93191AC1F365}"/>
+              </a:ext>
+            </a:extLst>
+          </p:cNvPr>
+          <p:cNvPicPr>
+            <a:picLocks noChangeAspect="1"/>
+          </p:cNvPicPr>
+          <p:nvPr/>
+        </p:nvPicPr>
+        <p:blipFill>
+          <a:blip r:embed="rId6"/>
+          <a:stretch>
+            <a:fillRect/>
+          </a:stretch>
+        </p:blipFill>
+        <p:spPr>
+          <a:xfrm>
+            <a:off x="7362561" y="2339324"/>
+            <a:ext cx="1838582" cy="381053"/>
+          </a:xfrm>
+          <a:prstGeom prst="rect">
+            <a:avLst/>
+          </a:prstGeom>
+        </p:spPr>
+      </p:pic>
+      <p:pic>
+        <p:nvPicPr>
+          <p:cNvPr id="15" name="Picture 14">
+            <a:extLst>
+              <a:ext uri="{FF2B5EF4-FFF2-40B4-BE49-F238E27FC236}">
+                <a16:creationId xmlns:a16="http://schemas.microsoft.com/office/drawing/2014/main" id="{74B1D087-01B4-4FBD-BA1E-F57D10E3709F}"/>
+              </a:ext>
+            </a:extLst>
+          </p:cNvPr>
+          <p:cNvPicPr>
+            <a:picLocks noChangeAspect="1"/>
+          </p:cNvPicPr>
+          <p:nvPr/>
+        </p:nvPicPr>
+        <p:blipFill>
+          <a:blip r:embed="rId7"/>
+          <a:stretch>
+            <a:fillRect/>
+          </a:stretch>
+        </p:blipFill>
+        <p:spPr>
+          <a:xfrm>
+            <a:off x="7362561" y="3419473"/>
+            <a:ext cx="1819529" cy="381053"/>
+          </a:xfrm>
+          <a:prstGeom prst="rect">
+            <a:avLst/>
+          </a:prstGeom>
+        </p:spPr>
+      </p:pic>
+      <p:pic>
+        <p:nvPicPr>
+          <p:cNvPr id="17" name="Picture 16">
+            <a:extLst>
+              <a:ext uri="{FF2B5EF4-FFF2-40B4-BE49-F238E27FC236}">
+                <a16:creationId xmlns:a16="http://schemas.microsoft.com/office/drawing/2014/main" id="{A126AE99-91B7-47D3-8A7E-C7B80A4A910B}"/>
+              </a:ext>
+            </a:extLst>
+          </p:cNvPr>
+          <p:cNvPicPr>
+            <a:picLocks noChangeAspect="1"/>
+          </p:cNvPicPr>
+          <p:nvPr/>
+        </p:nvPicPr>
+        <p:blipFill>
+          <a:blip r:embed="rId8"/>
+          <a:stretch>
+            <a:fillRect/>
+          </a:stretch>
+        </p:blipFill>
+        <p:spPr>
+          <a:xfrm>
+            <a:off x="1470559" y="4445982"/>
+            <a:ext cx="1228896" cy="190527"/>
+          </a:xfrm>
+          <a:prstGeom prst="rect">
+            <a:avLst/>
+          </a:prstGeom>
+        </p:spPr>
+      </p:pic>
+    </p:spTree>
+    <p:extLst>
+      <p:ext uri="{BB962C8B-B14F-4D97-AF65-F5344CB8AC3E}">
+        <p14:creationId xmlns:p14="http://schemas.microsoft.com/office/powerpoint/2010/main" val="1223163485"/>
+      </p:ext>
+    </p:extLst>
+  </p:cSld>
+  <p:clrMapOvr>
+    <a:masterClrMapping/>
+  </p:clrMapOvr>
+</p:sld>
+</file>
+
+<file path=ppt/slides/slide16.xml><?xml version="1.0" encoding="utf-8"?>
 <p:sld xmlns:a="http://schemas.openxmlformats.org/drawingml/2006/main" xmlns:r="http://schemas.openxmlformats.org/officeDocument/2006/relationships" xmlns:p="http://schemas.openxmlformats.org/presentationml/2006/main">
   <p:cSld>
     <p:spTree>
@@ -8717,7 +9779,276 @@
 </p:sld>
 </file>
 
-<file path=ppt/slides/slide14.xml><?xml version="1.0" encoding="utf-8"?>
+<file path=ppt/slides/slide17.xml><?xml version="1.0" encoding="utf-8"?>
+<p:sld xmlns:a="http://schemas.openxmlformats.org/drawingml/2006/main" xmlns:r="http://schemas.openxmlformats.org/officeDocument/2006/relationships" xmlns:p="http://schemas.openxmlformats.org/presentationml/2006/main">
+  <p:cSld>
+    <p:spTree>
+      <p:nvGrpSpPr>
+        <p:cNvPr id="1" name=""/>
+        <p:cNvGrpSpPr/>
+        <p:nvPr/>
+      </p:nvGrpSpPr>
+      <p:grpSpPr>
+        <a:xfrm>
+          <a:off x="0" y="0"/>
+          <a:ext cx="0" cy="0"/>
+          <a:chOff x="0" y="0"/>
+          <a:chExt cx="0" cy="0"/>
+        </a:xfrm>
+      </p:grpSpPr>
+      <p:sp>
+        <p:nvSpPr>
+          <p:cNvPr id="2" name="Title 1">
+            <a:extLst>
+              <a:ext uri="{FF2B5EF4-FFF2-40B4-BE49-F238E27FC236}">
+                <a16:creationId xmlns:a16="http://schemas.microsoft.com/office/drawing/2014/main" id="{88F59FC4-3334-47AF-A4D0-E92189781557}"/>
+              </a:ext>
+            </a:extLst>
+          </p:cNvPr>
+          <p:cNvSpPr>
+            <a:spLocks noGrp="1"/>
+          </p:cNvSpPr>
+          <p:nvPr>
+            <p:ph type="title"/>
+          </p:nvPr>
+        </p:nvSpPr>
+        <p:spPr/>
+        <p:txBody>
+          <a:bodyPr/>
+          <a:lstStyle/>
+          <a:p>
+            <a:r>
+              <a:rPr lang="en-US" dirty="0"/>
+              <a:t>In class practice : what is the result for those code?</a:t>
+            </a:r>
+            <a:endParaRPr lang="en-MY" dirty="0"/>
+          </a:p>
+        </p:txBody>
+      </p:sp>
+      <p:pic>
+        <p:nvPicPr>
+          <p:cNvPr id="4" name="Picture 3">
+            <a:extLst>
+              <a:ext uri="{FF2B5EF4-FFF2-40B4-BE49-F238E27FC236}">
+                <a16:creationId xmlns:a16="http://schemas.microsoft.com/office/drawing/2014/main" id="{460570A8-AFD8-4049-8C4F-7B66029B464A}"/>
+              </a:ext>
+            </a:extLst>
+          </p:cNvPr>
+          <p:cNvPicPr>
+            <a:picLocks noChangeAspect="1"/>
+          </p:cNvPicPr>
+          <p:nvPr/>
+        </p:nvPicPr>
+        <p:blipFill>
+          <a:blip r:embed="rId2"/>
+          <a:stretch>
+            <a:fillRect/>
+          </a:stretch>
+        </p:blipFill>
+        <p:spPr>
+          <a:xfrm>
+            <a:off x="1166289" y="2638434"/>
+            <a:ext cx="1638529" cy="571580"/>
+          </a:xfrm>
+          <a:prstGeom prst="rect">
+            <a:avLst/>
+          </a:prstGeom>
+        </p:spPr>
+      </p:pic>
+      <p:pic>
+        <p:nvPicPr>
+          <p:cNvPr id="6" name="Picture 5">
+            <a:extLst>
+              <a:ext uri="{FF2B5EF4-FFF2-40B4-BE49-F238E27FC236}">
+                <a16:creationId xmlns:a16="http://schemas.microsoft.com/office/drawing/2014/main" id="{5C03394A-2278-40C4-96DD-EBFA08ABE3A6}"/>
+              </a:ext>
+            </a:extLst>
+          </p:cNvPr>
+          <p:cNvPicPr>
+            <a:picLocks noChangeAspect="1"/>
+          </p:cNvPicPr>
+          <p:nvPr/>
+        </p:nvPicPr>
+        <p:blipFill>
+          <a:blip r:embed="rId3"/>
+          <a:stretch>
+            <a:fillRect/>
+          </a:stretch>
+        </p:blipFill>
+        <p:spPr>
+          <a:xfrm>
+            <a:off x="1166289" y="4411081"/>
+            <a:ext cx="1524213" cy="381053"/>
+          </a:xfrm>
+          <a:prstGeom prst="rect">
+            <a:avLst/>
+          </a:prstGeom>
+        </p:spPr>
+      </p:pic>
+      <p:pic>
+        <p:nvPicPr>
+          <p:cNvPr id="8" name="Picture 7">
+            <a:extLst>
+              <a:ext uri="{FF2B5EF4-FFF2-40B4-BE49-F238E27FC236}">
+                <a16:creationId xmlns:a16="http://schemas.microsoft.com/office/drawing/2014/main" id="{D68E64D6-86D2-4D28-905B-9F04DAA3C0E8}"/>
+              </a:ext>
+            </a:extLst>
+          </p:cNvPr>
+          <p:cNvPicPr>
+            <a:picLocks noChangeAspect="1"/>
+          </p:cNvPicPr>
+          <p:nvPr/>
+        </p:nvPicPr>
+        <p:blipFill>
+          <a:blip r:embed="rId4"/>
+          <a:stretch>
+            <a:fillRect/>
+          </a:stretch>
+        </p:blipFill>
+        <p:spPr>
+          <a:xfrm>
+            <a:off x="4275881" y="2638434"/>
+            <a:ext cx="2333951" cy="181000"/>
+          </a:xfrm>
+          <a:prstGeom prst="rect">
+            <a:avLst/>
+          </a:prstGeom>
+        </p:spPr>
+      </p:pic>
+      <p:pic>
+        <p:nvPicPr>
+          <p:cNvPr id="10" name="Picture 9">
+            <a:extLst>
+              <a:ext uri="{FF2B5EF4-FFF2-40B4-BE49-F238E27FC236}">
+                <a16:creationId xmlns:a16="http://schemas.microsoft.com/office/drawing/2014/main" id="{5F92C1B3-B050-4E79-B464-D4589B0CA201}"/>
+              </a:ext>
+            </a:extLst>
+          </p:cNvPr>
+          <p:cNvPicPr>
+            <a:picLocks noChangeAspect="1"/>
+          </p:cNvPicPr>
+          <p:nvPr/>
+        </p:nvPicPr>
+        <p:blipFill>
+          <a:blip r:embed="rId5"/>
+          <a:stretch>
+            <a:fillRect/>
+          </a:stretch>
+        </p:blipFill>
+        <p:spPr>
+          <a:xfrm>
+            <a:off x="4275881" y="5069272"/>
+            <a:ext cx="1943371" cy="161948"/>
+          </a:xfrm>
+          <a:prstGeom prst="rect">
+            <a:avLst/>
+          </a:prstGeom>
+        </p:spPr>
+      </p:pic>
+      <p:pic>
+        <p:nvPicPr>
+          <p:cNvPr id="12" name="Picture 11">
+            <a:extLst>
+              <a:ext uri="{FF2B5EF4-FFF2-40B4-BE49-F238E27FC236}">
+                <a16:creationId xmlns:a16="http://schemas.microsoft.com/office/drawing/2014/main" id="{93031F4B-2664-4D0F-B514-723CAF020D16}"/>
+              </a:ext>
+            </a:extLst>
+          </p:cNvPr>
+          <p:cNvPicPr>
+            <a:picLocks noChangeAspect="1"/>
+          </p:cNvPicPr>
+          <p:nvPr/>
+        </p:nvPicPr>
+        <p:blipFill>
+          <a:blip r:embed="rId6"/>
+          <a:stretch>
+            <a:fillRect/>
+          </a:stretch>
+        </p:blipFill>
+        <p:spPr>
+          <a:xfrm>
+            <a:off x="4275881" y="4410108"/>
+            <a:ext cx="1600423" cy="181000"/>
+          </a:xfrm>
+          <a:prstGeom prst="rect">
+            <a:avLst/>
+          </a:prstGeom>
+        </p:spPr>
+      </p:pic>
+      <p:pic>
+        <p:nvPicPr>
+          <p:cNvPr id="14" name="Picture 13">
+            <a:extLst>
+              <a:ext uri="{FF2B5EF4-FFF2-40B4-BE49-F238E27FC236}">
+                <a16:creationId xmlns:a16="http://schemas.microsoft.com/office/drawing/2014/main" id="{96F25BB0-EB4F-46CE-A264-1FE8614A7B49}"/>
+              </a:ext>
+            </a:extLst>
+          </p:cNvPr>
+          <p:cNvPicPr>
+            <a:picLocks noChangeAspect="1"/>
+          </p:cNvPicPr>
+          <p:nvPr/>
+        </p:nvPicPr>
+        <p:blipFill>
+          <a:blip r:embed="rId7"/>
+          <a:stretch>
+            <a:fillRect/>
+          </a:stretch>
+        </p:blipFill>
+        <p:spPr>
+          <a:xfrm>
+            <a:off x="7807902" y="4374883"/>
+            <a:ext cx="2114845" cy="228632"/>
+          </a:xfrm>
+          <a:prstGeom prst="rect">
+            <a:avLst/>
+          </a:prstGeom>
+        </p:spPr>
+      </p:pic>
+      <p:pic>
+        <p:nvPicPr>
+          <p:cNvPr id="16" name="Picture 15">
+            <a:extLst>
+              <a:ext uri="{FF2B5EF4-FFF2-40B4-BE49-F238E27FC236}">
+                <a16:creationId xmlns:a16="http://schemas.microsoft.com/office/drawing/2014/main" id="{860072E4-774E-423A-925B-574537AA164C}"/>
+              </a:ext>
+            </a:extLst>
+          </p:cNvPr>
+          <p:cNvPicPr>
+            <a:picLocks noChangeAspect="1"/>
+          </p:cNvPicPr>
+          <p:nvPr/>
+        </p:nvPicPr>
+        <p:blipFill>
+          <a:blip r:embed="rId8"/>
+          <a:stretch>
+            <a:fillRect/>
+          </a:stretch>
+        </p:blipFill>
+        <p:spPr>
+          <a:xfrm>
+            <a:off x="7851471" y="4983670"/>
+            <a:ext cx="1638529" cy="190527"/>
+          </a:xfrm>
+          <a:prstGeom prst="rect">
+            <a:avLst/>
+          </a:prstGeom>
+        </p:spPr>
+      </p:pic>
+    </p:spTree>
+    <p:extLst>
+      <p:ext uri="{BB962C8B-B14F-4D97-AF65-F5344CB8AC3E}">
+        <p14:creationId xmlns:p14="http://schemas.microsoft.com/office/powerpoint/2010/main" val="3203192987"/>
+      </p:ext>
+    </p:extLst>
+  </p:cSld>
+  <p:clrMapOvr>
+    <a:masterClrMapping/>
+  </p:clrMapOvr>
+</p:sld>
+</file>
+
+<file path=ppt/slides/slide18.xml><?xml version="1.0" encoding="utf-8"?>
 <p:sld xmlns:a="http://schemas.openxmlformats.org/drawingml/2006/main" xmlns:r="http://schemas.openxmlformats.org/officeDocument/2006/relationships" xmlns:p="http://schemas.openxmlformats.org/presentationml/2006/main">
   <p:cSld>
     <p:spTree>
@@ -9343,8 +10674,8 @@
         </p:nvSpPr>
         <p:spPr>
           <a:xfrm>
-            <a:off x="5155094" y="2266788"/>
-            <a:ext cx="3193776" cy="924847"/>
+            <a:off x="5155093" y="2266788"/>
+            <a:ext cx="3640563" cy="924847"/>
           </a:xfrm>
           <a:prstGeom prst="borderCallout2">
             <a:avLst>
@@ -9540,8 +10871,8 @@
               <a:gd name="adj2" fmla="val -8333"/>
               <a:gd name="adj3" fmla="val 18750"/>
               <a:gd name="adj4" fmla="val -16667"/>
-              <a:gd name="adj5" fmla="val -86510"/>
-              <a:gd name="adj6" fmla="val -36638"/>
+              <a:gd name="adj5" fmla="val -64234"/>
+              <a:gd name="adj6" fmla="val -35547"/>
             </a:avLst>
           </a:prstGeom>
           <a:solidFill>
@@ -9585,7 +10916,7 @@
             </a:r>
             <a:r>
               <a:rPr lang="en-US" dirty="0"/>
-              <a:t>and wait for user key in one string, Enter to end</a:t>
+              <a:t>and wait for user key in one string, Enter key to finish</a:t>
             </a:r>
             <a:endParaRPr lang="en-MY" dirty="0">
               <a:solidFill>
@@ -9610,7 +10941,7 @@
         <p:spPr>
           <a:xfrm>
             <a:off x="3955772" y="4975594"/>
-            <a:ext cx="3411100" cy="924847"/>
+            <a:ext cx="3820982" cy="924847"/>
           </a:xfrm>
           <a:prstGeom prst="borderCallout2">
             <a:avLst>
@@ -10512,7 +11843,7 @@
           <a:p>
             <a:r>
               <a:rPr lang="en-US" dirty="0"/>
-              <a:t>variables</a:t>
+              <a:t>Variable: name, reference to value with ‘=‘</a:t>
             </a:r>
             <a:endParaRPr lang="en-MY" dirty="0"/>
           </a:p>
@@ -10582,7 +11913,19 @@
           <a:p>
             <a:r>
               <a:rPr lang="en-MY" sz="2000" dirty="0"/>
-              <a:t>A variable can be assigned a value using assignment operator ‘=‘:</a:t>
+              <a:t>A variable can be assigned a value using </a:t>
+            </a:r>
+            <a:r>
+              <a:rPr lang="en-MY" sz="2000" dirty="0">
+                <a:solidFill>
+                  <a:srgbClr val="FFFF00"/>
+                </a:solidFill>
+              </a:rPr>
+              <a:t>assignment operator</a:t>
+            </a:r>
+            <a:r>
+              <a:rPr lang="en-MY" sz="2000" dirty="0"/>
+              <a:t> ‘=‘:</a:t>
             </a:r>
           </a:p>
           <a:p>
@@ -10662,7 +12005,7 @@
         </p:blipFill>
         <p:spPr>
           <a:xfrm>
-            <a:off x="7363213" y="906720"/>
+            <a:off x="7807351" y="1776437"/>
             <a:ext cx="2114848" cy="990498"/>
           </a:xfrm>
           <a:prstGeom prst="rect">
@@ -10684,7 +12027,7 @@
         </p:nvSpPr>
         <p:spPr>
           <a:xfrm flipH="1">
-            <a:off x="6556251" y="2305615"/>
+            <a:off x="6991680" y="3054552"/>
             <a:ext cx="4949948" cy="2246769"/>
           </a:xfrm>
           <a:prstGeom prst="rect">
@@ -10898,7 +12241,7 @@
           <a:p>
             <a:r>
               <a:rPr lang="en-US" dirty="0"/>
-              <a:t>Data Types</a:t>
+              <a:t>Variable: dynamic, duck typing</a:t>
             </a:r>
             <a:endParaRPr lang="en-MY" dirty="0"/>
           </a:p>
@@ -10934,7 +12277,19 @@
           <a:p>
             <a:r>
               <a:rPr lang="en-MY" sz="2400" dirty="0"/>
-              <a:t>Unlike many other programming language, Python does not give variables types.</a:t>
+              <a:t>Unlike many other programming language, Python does not give variables types. (Dynamic language, </a:t>
+            </a:r>
+            <a:r>
+              <a:rPr lang="en-MY" sz="2400" dirty="0">
+                <a:solidFill>
+                  <a:srgbClr val="FFFF00"/>
+                </a:solidFill>
+              </a:rPr>
+              <a:t>duck typing</a:t>
+            </a:r>
+            <a:r>
+              <a:rPr lang="en-MY" sz="2400" dirty="0"/>
+              <a:t>)</a:t>
             </a:r>
           </a:p>
           <a:p>
@@ -11039,7 +12394,7 @@
             </a:r>
             <a:r>
               <a:rPr lang="en-US" dirty="0"/>
-              <a:t>’ is created, and assigned value 12, which is an integer number. Thus is with type &lt;int&gt;</a:t>
+              <a:t>’ is created, and assigned value 12, which is an integer number. Thus it is with type &lt;int&gt;</a:t>
             </a:r>
             <a:endParaRPr lang="en-MY" dirty="0">
               <a:solidFill>
@@ -11211,19 +12566,31 @@
           <a:lstStyle/>
           <a:p>
             <a:r>
-              <a:rPr lang="en-MY" sz="2800" dirty="0"/>
+              <a:rPr lang="en-MY" sz="2800" dirty="0">
+                <a:solidFill>
+                  <a:srgbClr val="FFFF00"/>
+                </a:solidFill>
+              </a:rPr>
               <a:t>int</a:t>
             </a:r>
           </a:p>
           <a:p>
             <a:r>
-              <a:rPr lang="en-MY" sz="2800" dirty="0"/>
+              <a:rPr lang="en-MY" sz="2800" dirty="0">
+                <a:solidFill>
+                  <a:srgbClr val="FFFF00"/>
+                </a:solidFill>
+              </a:rPr>
               <a:t>float</a:t>
             </a:r>
           </a:p>
           <a:p>
             <a:r>
-              <a:rPr lang="en-MY" sz="2800" dirty="0"/>
+              <a:rPr lang="en-MY" sz="2800" dirty="0">
+                <a:solidFill>
+                  <a:srgbClr val="FFFF00"/>
+                </a:solidFill>
+              </a:rPr>
               <a:t>bool</a:t>
             </a:r>
           </a:p>

</xml_diff>